<commit_message>
Add updated fatigueRepReport and MATLAB ppt
</commit_message>
<xml_diff>
--- a/Capstone/Presentations/MATLAB_Analysis.pptx
+++ b/Capstone/Presentations/MATLAB_Analysis.pptx
@@ -9,7 +9,6 @@
     <p:sldId id="257" r:id="rId3"/>
     <p:sldId id="259" r:id="rId4"/>
     <p:sldId id="258" r:id="rId5"/>
-    <p:sldId id="260" r:id="rId6"/>
   </p:sldIdLst>
   <p:sldSz cx="12192000" cy="6858000"/>
   <p:notesSz cx="6858000" cy="9144000"/>
@@ -257,7 +256,7 @@
           <a:p>
             <a:fld id="{4DA2220E-0CC1-4FD5-858A-D8CA1A7C30FB}" type="datetimeFigureOut">
               <a:rPr lang="en-US" smtClean="0"/>
-              <a:t>5/19/2016</a:t>
+              <a:t>5/26/2016</a:t>
             </a:fld>
             <a:endParaRPr lang="en-US"/>
           </a:p>
@@ -425,7 +424,7 @@
           <a:p>
             <a:fld id="{4DA2220E-0CC1-4FD5-858A-D8CA1A7C30FB}" type="datetimeFigureOut">
               <a:rPr lang="en-US" smtClean="0"/>
-              <a:t>5/19/2016</a:t>
+              <a:t>5/26/2016</a:t>
             </a:fld>
             <a:endParaRPr lang="en-US"/>
           </a:p>
@@ -603,7 +602,7 @@
           <a:p>
             <a:fld id="{4DA2220E-0CC1-4FD5-858A-D8CA1A7C30FB}" type="datetimeFigureOut">
               <a:rPr lang="en-US" smtClean="0"/>
-              <a:t>5/19/2016</a:t>
+              <a:t>5/26/2016</a:t>
             </a:fld>
             <a:endParaRPr lang="en-US"/>
           </a:p>
@@ -771,7 +770,7 @@
           <a:p>
             <a:fld id="{4DA2220E-0CC1-4FD5-858A-D8CA1A7C30FB}" type="datetimeFigureOut">
               <a:rPr lang="en-US" smtClean="0"/>
-              <a:t>5/19/2016</a:t>
+              <a:t>5/26/2016</a:t>
             </a:fld>
             <a:endParaRPr lang="en-US"/>
           </a:p>
@@ -1016,7 +1015,7 @@
           <a:p>
             <a:fld id="{4DA2220E-0CC1-4FD5-858A-D8CA1A7C30FB}" type="datetimeFigureOut">
               <a:rPr lang="en-US" smtClean="0"/>
-              <a:t>5/19/2016</a:t>
+              <a:t>5/26/2016</a:t>
             </a:fld>
             <a:endParaRPr lang="en-US"/>
           </a:p>
@@ -1245,7 +1244,7 @@
           <a:p>
             <a:fld id="{4DA2220E-0CC1-4FD5-858A-D8CA1A7C30FB}" type="datetimeFigureOut">
               <a:rPr lang="en-US" smtClean="0"/>
-              <a:t>5/19/2016</a:t>
+              <a:t>5/26/2016</a:t>
             </a:fld>
             <a:endParaRPr lang="en-US"/>
           </a:p>
@@ -1609,7 +1608,7 @@
           <a:p>
             <a:fld id="{4DA2220E-0CC1-4FD5-858A-D8CA1A7C30FB}" type="datetimeFigureOut">
               <a:rPr lang="en-US" smtClean="0"/>
-              <a:t>5/19/2016</a:t>
+              <a:t>5/26/2016</a:t>
             </a:fld>
             <a:endParaRPr lang="en-US"/>
           </a:p>
@@ -1726,7 +1725,7 @@
           <a:p>
             <a:fld id="{4DA2220E-0CC1-4FD5-858A-D8CA1A7C30FB}" type="datetimeFigureOut">
               <a:rPr lang="en-US" smtClean="0"/>
-              <a:t>5/19/2016</a:t>
+              <a:t>5/26/2016</a:t>
             </a:fld>
             <a:endParaRPr lang="en-US"/>
           </a:p>
@@ -1821,7 +1820,7 @@
           <a:p>
             <a:fld id="{4DA2220E-0CC1-4FD5-858A-D8CA1A7C30FB}" type="datetimeFigureOut">
               <a:rPr lang="en-US" smtClean="0"/>
-              <a:t>5/19/2016</a:t>
+              <a:t>5/26/2016</a:t>
             </a:fld>
             <a:endParaRPr lang="en-US"/>
           </a:p>
@@ -2096,7 +2095,7 @@
           <a:p>
             <a:fld id="{4DA2220E-0CC1-4FD5-858A-D8CA1A7C30FB}" type="datetimeFigureOut">
               <a:rPr lang="en-US" smtClean="0"/>
-              <a:t>5/19/2016</a:t>
+              <a:t>5/26/2016</a:t>
             </a:fld>
             <a:endParaRPr lang="en-US"/>
           </a:p>
@@ -2348,7 +2347,7 @@
           <a:p>
             <a:fld id="{4DA2220E-0CC1-4FD5-858A-D8CA1A7C30FB}" type="datetimeFigureOut">
               <a:rPr lang="en-US" smtClean="0"/>
-              <a:t>5/19/2016</a:t>
+              <a:t>5/26/2016</a:t>
             </a:fld>
             <a:endParaRPr lang="en-US"/>
           </a:p>
@@ -2559,7 +2558,7 @@
           <a:p>
             <a:fld id="{4DA2220E-0CC1-4FD5-858A-D8CA1A7C30FB}" type="datetimeFigureOut">
               <a:rPr lang="en-US" smtClean="0"/>
-              <a:t>5/19/2016</a:t>
+              <a:t>5/26/2016</a:t>
             </a:fld>
             <a:endParaRPr lang="en-US"/>
           </a:p>
@@ -3033,8 +3032,24 @@
           </a:p>
           <a:p>
             <a:r>
+              <a:rPr lang="en-US" dirty="0" smtClean="0"/>
+              <a:t>The </a:t>
+            </a:r>
+            <a:r>
+              <a:rPr lang="en-US" i="1" dirty="0" smtClean="0"/>
+              <a:t>absolute</a:t>
+            </a:r>
+            <a:r>
+              <a:rPr lang="en-US" dirty="0" smtClean="0"/>
+              <a:t> d</a:t>
+            </a:r>
+            <a:r>
+              <a:rPr lang="en-US" dirty="0" smtClean="0"/>
+              <a:t>ifference </a:t>
+            </a:r>
+            <a:r>
               <a:rPr lang="en-US" dirty="0"/>
-              <a:t>Difference between output matrix rep counts and observed rep count was summed for all data sets</a:t>
+              <a:t>between output matrix rep counts and observed rep count was summed for all data sets</a:t>
             </a:r>
           </a:p>
           <a:p>
@@ -3075,30 +3090,6 @@
           <a:chExt cx="0" cy="0"/>
         </a:xfrm>
       </p:grpSpPr>
-      <p:pic>
-        <p:nvPicPr>
-          <p:cNvPr id="3" name="Picture 2"/>
-          <p:cNvPicPr>
-            <a:picLocks noChangeAspect="1"/>
-          </p:cNvPicPr>
-          <p:nvPr/>
-        </p:nvPicPr>
-        <p:blipFill>
-          <a:blip r:embed="rId2"/>
-          <a:stretch>
-            <a:fillRect/>
-          </a:stretch>
-        </p:blipFill>
-        <p:spPr>
-          <a:xfrm>
-            <a:off x="2238375" y="462914"/>
-            <a:ext cx="7306895" cy="4070985"/>
-          </a:xfrm>
-          <a:prstGeom prst="rect">
-            <a:avLst/>
-          </a:prstGeom>
-        </p:spPr>
-      </p:pic>
       <p:sp>
         <p:nvSpPr>
           <p:cNvPr id="6" name="Content Placeholder 2"/>
@@ -3285,22 +3276,107 @@
           <a:p>
             <a:r>
               <a:rPr lang="en-US" dirty="0"/>
-              <a:t>Best values for detecting reps:</a:t>
-            </a:r>
+              <a:t>Best values for detecting </a:t>
+            </a:r>
+            <a:r>
+              <a:rPr lang="en-US" dirty="0" smtClean="0"/>
+              <a:t>reps :</a:t>
+            </a:r>
+            <a:endParaRPr lang="en-US" dirty="0"/>
           </a:p>
           <a:p>
             <a:pPr lvl="1"/>
             <a:r>
               <a:rPr lang="en-US" dirty="0"/>
-              <a:t>BASELINE = 0.40</a:t>
-            </a:r>
+              <a:t>BASELINE = </a:t>
+            </a:r>
+            <a:r>
+              <a:rPr lang="en-US" dirty="0" smtClean="0"/>
+              <a:t>0.40  -&gt; 0.35</a:t>
+            </a:r>
+            <a:endParaRPr lang="en-US" dirty="0"/>
           </a:p>
           <a:p>
             <a:pPr lvl="1"/>
             <a:r>
               <a:rPr lang="en-US" dirty="0"/>
-              <a:t>THRESHOLD = 0.50 </a:t>
-            </a:r>
+              <a:t>THRESHOLD = </a:t>
+            </a:r>
+            <a:r>
+              <a:rPr lang="en-US" dirty="0" smtClean="0"/>
+              <a:t>0.50 -&gt; 0.60 </a:t>
+            </a:r>
+            <a:endParaRPr lang="en-US" dirty="0"/>
+          </a:p>
+        </p:txBody>
+      </p:sp>
+      <p:pic>
+        <p:nvPicPr>
+          <p:cNvPr id="2" name="Picture 1"/>
+          <p:cNvPicPr>
+            <a:picLocks noChangeAspect="1"/>
+          </p:cNvPicPr>
+          <p:nvPr/>
+        </p:nvPicPr>
+        <p:blipFill>
+          <a:blip r:embed="rId2"/>
+          <a:stretch>
+            <a:fillRect/>
+          </a:stretch>
+        </p:blipFill>
+        <p:spPr>
+          <a:xfrm>
+            <a:off x="2476500" y="489555"/>
+            <a:ext cx="7258050" cy="3894388"/>
+          </a:xfrm>
+          <a:prstGeom prst="rect">
+            <a:avLst/>
+          </a:prstGeom>
+        </p:spPr>
+      </p:pic>
+      <p:sp>
+        <p:nvSpPr>
+          <p:cNvPr id="4" name="Oval 3"/>
+          <p:cNvSpPr/>
+          <p:nvPr/>
+        </p:nvSpPr>
+        <p:spPr>
+          <a:xfrm>
+            <a:off x="4819136" y="3377511"/>
+            <a:ext cx="716692" cy="387179"/>
+          </a:xfrm>
+          <a:prstGeom prst="ellipse">
+            <a:avLst/>
+          </a:prstGeom>
+          <a:noFill/>
+          <a:ln>
+            <a:solidFill>
+              <a:srgbClr val="FF0000"/>
+            </a:solidFill>
+          </a:ln>
+        </p:spPr>
+        <p:style>
+          <a:lnRef idx="2">
+            <a:schemeClr val="accent1">
+              <a:shade val="50000"/>
+            </a:schemeClr>
+          </a:lnRef>
+          <a:fillRef idx="1">
+            <a:schemeClr val="accent1"/>
+          </a:fillRef>
+          <a:effectRef idx="0">
+            <a:schemeClr val="accent1"/>
+          </a:effectRef>
+          <a:fontRef idx="minor">
+            <a:schemeClr val="lt1"/>
+          </a:fontRef>
+        </p:style>
+        <p:txBody>
+          <a:bodyPr rtlCol="0" anchor="ctr"/>
+          <a:lstStyle/>
+          <a:p>
+            <a:pPr algn="ctr"/>
+            <a:endParaRPr lang="en-US"/>
           </a:p>
         </p:txBody>
       </p:sp>
@@ -3438,30 +3514,6 @@
           <a:chExt cx="0" cy="0"/>
         </a:xfrm>
       </p:grpSpPr>
-      <p:pic>
-        <p:nvPicPr>
-          <p:cNvPr id="2" name="Picture 1"/>
-          <p:cNvPicPr>
-            <a:picLocks noChangeAspect="1"/>
-          </p:cNvPicPr>
-          <p:nvPr/>
-        </p:nvPicPr>
-        <p:blipFill>
-          <a:blip r:embed="rId2"/>
-          <a:stretch>
-            <a:fillRect/>
-          </a:stretch>
-        </p:blipFill>
-        <p:spPr>
-          <a:xfrm>
-            <a:off x="3586162" y="409575"/>
-            <a:ext cx="4581525" cy="4876800"/>
-          </a:xfrm>
-          <a:prstGeom prst="rect">
-            <a:avLst/>
-          </a:prstGeom>
-        </p:spPr>
-      </p:pic>
       <p:sp>
         <p:nvSpPr>
           <p:cNvPr id="3" name="Content Placeholder 2"/>
@@ -3648,8 +3700,83 @@
           <a:p>
             <a:r>
               <a:rPr lang="en-US" dirty="0"/>
-              <a:t>Best value for detecting fatigue:	0.28</a:t>
-            </a:r>
+              <a:t>Best value for detecting fatigue:	</a:t>
+            </a:r>
+            <a:r>
+              <a:rPr lang="en-US" dirty="0" smtClean="0"/>
+              <a:t>0.16</a:t>
+            </a:r>
+            <a:endParaRPr lang="en-US" dirty="0"/>
+          </a:p>
+        </p:txBody>
+      </p:sp>
+      <p:pic>
+        <p:nvPicPr>
+          <p:cNvPr id="4" name="Picture 3"/>
+          <p:cNvPicPr>
+            <a:picLocks noChangeAspect="1"/>
+          </p:cNvPicPr>
+          <p:nvPr/>
+        </p:nvPicPr>
+        <p:blipFill>
+          <a:blip r:embed="rId2"/>
+          <a:stretch>
+            <a:fillRect/>
+          </a:stretch>
+        </p:blipFill>
+        <p:spPr>
+          <a:xfrm>
+            <a:off x="3954161" y="431614"/>
+            <a:ext cx="4215199" cy="4507615"/>
+          </a:xfrm>
+          <a:prstGeom prst="rect">
+            <a:avLst/>
+          </a:prstGeom>
+        </p:spPr>
+      </p:pic>
+      <p:sp>
+        <p:nvSpPr>
+          <p:cNvPr id="5" name="Oval 4"/>
+          <p:cNvSpPr/>
+          <p:nvPr/>
+        </p:nvSpPr>
+        <p:spPr>
+          <a:xfrm>
+            <a:off x="7595286" y="1655805"/>
+            <a:ext cx="716692" cy="387179"/>
+          </a:xfrm>
+          <a:prstGeom prst="ellipse">
+            <a:avLst/>
+          </a:prstGeom>
+          <a:noFill/>
+          <a:ln>
+            <a:solidFill>
+              <a:srgbClr val="FF0000"/>
+            </a:solidFill>
+          </a:ln>
+        </p:spPr>
+        <p:style>
+          <a:lnRef idx="2">
+            <a:schemeClr val="accent1">
+              <a:shade val="50000"/>
+            </a:schemeClr>
+          </a:lnRef>
+          <a:fillRef idx="1">
+            <a:schemeClr val="accent1"/>
+          </a:fillRef>
+          <a:effectRef idx="0">
+            <a:schemeClr val="accent1"/>
+          </a:effectRef>
+          <a:fontRef idx="minor">
+            <a:schemeClr val="lt1"/>
+          </a:fontRef>
+        </p:style>
+        <p:txBody>
+          <a:bodyPr rtlCol="0" anchor="ctr"/>
+          <a:lstStyle/>
+          <a:p>
+            <a:pPr algn="ctr"/>
+            <a:endParaRPr lang="en-US"/>
           </a:p>
         </p:txBody>
       </p:sp>
@@ -3657,127 +3784,6 @@
     <p:extLst>
       <p:ext uri="{BB962C8B-B14F-4D97-AF65-F5344CB8AC3E}">
         <p14:creationId xmlns:p14="http://schemas.microsoft.com/office/powerpoint/2010/main" val="3647992805"/>
-      </p:ext>
-    </p:extLst>
-  </p:cSld>
-  <p:clrMapOvr>
-    <a:masterClrMapping/>
-  </p:clrMapOvr>
-</p:sld>
-</file>
-
-<file path=ppt/slides/slide5.xml><?xml version="1.0" encoding="utf-8"?>
-<p:sld xmlns:a="http://schemas.openxmlformats.org/drawingml/2006/main" xmlns:r="http://schemas.openxmlformats.org/officeDocument/2006/relationships" xmlns:p="http://schemas.openxmlformats.org/presentationml/2006/main">
-  <p:cSld>
-    <p:spTree>
-      <p:nvGrpSpPr>
-        <p:cNvPr id="1" name=""/>
-        <p:cNvGrpSpPr/>
-        <p:nvPr/>
-      </p:nvGrpSpPr>
-      <p:grpSpPr>
-        <a:xfrm>
-          <a:off x="0" y="0"/>
-          <a:ext cx="0" cy="0"/>
-          <a:chOff x="0" y="0"/>
-          <a:chExt cx="0" cy="0"/>
-        </a:xfrm>
-      </p:grpSpPr>
-      <p:sp>
-        <p:nvSpPr>
-          <p:cNvPr id="2" name="Title 1"/>
-          <p:cNvSpPr>
-            <a:spLocks noGrp="1"/>
-          </p:cNvSpPr>
-          <p:nvPr>
-            <p:ph type="title"/>
-          </p:nvPr>
-        </p:nvSpPr>
-        <p:spPr/>
-        <p:txBody>
-          <a:bodyPr/>
-          <a:lstStyle/>
-          <a:p>
-            <a:r>
-              <a:rPr lang="en-US" dirty="0"/>
-              <a:t>Next Steps</a:t>
-            </a:r>
-          </a:p>
-        </p:txBody>
-      </p:sp>
-      <p:sp>
-        <p:nvSpPr>
-          <p:cNvPr id="3" name="Content Placeholder 2"/>
-          <p:cNvSpPr>
-            <a:spLocks noGrp="1"/>
-          </p:cNvSpPr>
-          <p:nvPr>
-            <p:ph idx="1"/>
-          </p:nvPr>
-        </p:nvSpPr>
-        <p:spPr/>
-        <p:txBody>
-          <a:bodyPr/>
-          <a:lstStyle/>
-          <a:p>
-            <a:r>
-              <a:rPr lang="en-US" dirty="0"/>
-              <a:t>Refine calibration process</a:t>
-            </a:r>
-          </a:p>
-          <a:p>
-            <a:pPr lvl="1"/>
-            <a:r>
-              <a:rPr lang="en-US" dirty="0"/>
-              <a:t>MATLAB analysis used a pseudo-calibration to determine baseline and threshold values</a:t>
-            </a:r>
-          </a:p>
-          <a:p>
-            <a:pPr lvl="1"/>
-            <a:r>
-              <a:rPr lang="en-US" dirty="0"/>
-              <a:t>Finalize how calibration will be on the actual device and try to mimic in MATLAB</a:t>
-            </a:r>
-          </a:p>
-          <a:p>
-            <a:r>
-              <a:rPr lang="en-US" dirty="0"/>
-              <a:t>Refine fatigue detection</a:t>
-            </a:r>
-          </a:p>
-          <a:p>
-            <a:pPr lvl="1"/>
-            <a:r>
-              <a:rPr lang="en-US" dirty="0"/>
-              <a:t>The current algorithm detects fatigue too early</a:t>
-            </a:r>
-          </a:p>
-          <a:p>
-            <a:pPr lvl="1"/>
-            <a:r>
-              <a:rPr lang="en-US" dirty="0"/>
-              <a:t>Need a way to smooth out differences and look at overall upward trends</a:t>
-            </a:r>
-          </a:p>
-          <a:p>
-            <a:r>
-              <a:rPr lang="en-US" dirty="0"/>
-              <a:t>Port MATLAB improvements to Arduino</a:t>
-            </a:r>
-          </a:p>
-          <a:p>
-            <a:pPr lvl="1"/>
-            <a:r>
-              <a:rPr lang="en-US" dirty="0"/>
-              <a:t>Code running on Arduino should have all improvements from analysis</a:t>
-            </a:r>
-          </a:p>
-        </p:txBody>
-      </p:sp>
-    </p:spTree>
-    <p:extLst>
-      <p:ext uri="{BB962C8B-B14F-4D97-AF65-F5344CB8AC3E}">
-        <p14:creationId xmlns:p14="http://schemas.microsoft.com/office/powerpoint/2010/main" val="3137086021"/>
       </p:ext>
     </p:extLst>
   </p:cSld>

</xml_diff>